<commit_message>
exo 6 + update ressource utile
</commit_message>
<xml_diff>
--- a/2.docs/resources_utile.pptx
+++ b/2.docs/resources_utile.pptx
@@ -260,7 +260,7 @@
           <a:p>
             <a:fld id="{2A1E19D8-D9C5-4FA3-9D8C-70A2457B39A5}" type="datetimeFigureOut">
               <a:rPr lang="en-US" smtClean="0"/>
-              <a:t>3/10/2022</a:t>
+              <a:t>3/24/2022</a:t>
             </a:fld>
             <a:endParaRPr lang="en-US"/>
           </a:p>
@@ -458,7 +458,7 @@
           <a:p>
             <a:fld id="{2A1E19D8-D9C5-4FA3-9D8C-70A2457B39A5}" type="datetimeFigureOut">
               <a:rPr lang="en-US" smtClean="0"/>
-              <a:t>3/10/2022</a:t>
+              <a:t>3/24/2022</a:t>
             </a:fld>
             <a:endParaRPr lang="en-US"/>
           </a:p>
@@ -666,7 +666,7 @@
           <a:p>
             <a:fld id="{2A1E19D8-D9C5-4FA3-9D8C-70A2457B39A5}" type="datetimeFigureOut">
               <a:rPr lang="en-US" smtClean="0"/>
-              <a:t>3/10/2022</a:t>
+              <a:t>3/24/2022</a:t>
             </a:fld>
             <a:endParaRPr lang="en-US"/>
           </a:p>
@@ -864,7 +864,7 @@
           <a:p>
             <a:fld id="{2A1E19D8-D9C5-4FA3-9D8C-70A2457B39A5}" type="datetimeFigureOut">
               <a:rPr lang="en-US" smtClean="0"/>
-              <a:t>3/10/2022</a:t>
+              <a:t>3/24/2022</a:t>
             </a:fld>
             <a:endParaRPr lang="en-US"/>
           </a:p>
@@ -1139,7 +1139,7 @@
           <a:p>
             <a:fld id="{2A1E19D8-D9C5-4FA3-9D8C-70A2457B39A5}" type="datetimeFigureOut">
               <a:rPr lang="en-US" smtClean="0"/>
-              <a:t>3/10/2022</a:t>
+              <a:t>3/24/2022</a:t>
             </a:fld>
             <a:endParaRPr lang="en-US"/>
           </a:p>
@@ -1404,7 +1404,7 @@
           <a:p>
             <a:fld id="{2A1E19D8-D9C5-4FA3-9D8C-70A2457B39A5}" type="datetimeFigureOut">
               <a:rPr lang="en-US" smtClean="0"/>
-              <a:t>3/10/2022</a:t>
+              <a:t>3/24/2022</a:t>
             </a:fld>
             <a:endParaRPr lang="en-US"/>
           </a:p>
@@ -1816,7 +1816,7 @@
           <a:p>
             <a:fld id="{2A1E19D8-D9C5-4FA3-9D8C-70A2457B39A5}" type="datetimeFigureOut">
               <a:rPr lang="en-US" smtClean="0"/>
-              <a:t>3/10/2022</a:t>
+              <a:t>3/24/2022</a:t>
             </a:fld>
             <a:endParaRPr lang="en-US"/>
           </a:p>
@@ -1957,7 +1957,7 @@
           <a:p>
             <a:fld id="{2A1E19D8-D9C5-4FA3-9D8C-70A2457B39A5}" type="datetimeFigureOut">
               <a:rPr lang="en-US" smtClean="0"/>
-              <a:t>3/10/2022</a:t>
+              <a:t>3/24/2022</a:t>
             </a:fld>
             <a:endParaRPr lang="en-US"/>
           </a:p>
@@ -2070,7 +2070,7 @@
           <a:p>
             <a:fld id="{2A1E19D8-D9C5-4FA3-9D8C-70A2457B39A5}" type="datetimeFigureOut">
               <a:rPr lang="en-US" smtClean="0"/>
-              <a:t>3/10/2022</a:t>
+              <a:t>3/24/2022</a:t>
             </a:fld>
             <a:endParaRPr lang="en-US"/>
           </a:p>
@@ -2381,7 +2381,7 @@
           <a:p>
             <a:fld id="{2A1E19D8-D9C5-4FA3-9D8C-70A2457B39A5}" type="datetimeFigureOut">
               <a:rPr lang="en-US" smtClean="0"/>
-              <a:t>3/10/2022</a:t>
+              <a:t>3/24/2022</a:t>
             </a:fld>
             <a:endParaRPr lang="en-US"/>
           </a:p>
@@ -2669,7 +2669,7 @@
           <a:p>
             <a:fld id="{2A1E19D8-D9C5-4FA3-9D8C-70A2457B39A5}" type="datetimeFigureOut">
               <a:rPr lang="en-US" smtClean="0"/>
-              <a:t>3/10/2022</a:t>
+              <a:t>3/24/2022</a:t>
             </a:fld>
             <a:endParaRPr lang="en-US"/>
           </a:p>
@@ -2910,7 +2910,7 @@
           <a:p>
             <a:fld id="{2A1E19D8-D9C5-4FA3-9D8C-70A2457B39A5}" type="datetimeFigureOut">
               <a:rPr lang="en-US" smtClean="0"/>
-              <a:t>3/10/2022</a:t>
+              <a:t>3/24/2022</a:t>
             </a:fld>
             <a:endParaRPr lang="en-US"/>
           </a:p>
@@ -3381,7 +3381,9 @@
         </p:nvSpPr>
         <p:spPr/>
         <p:txBody>
-          <a:bodyPr/>
+          <a:bodyPr>
+            <a:normAutofit lnSpcReduction="10000"/>
+          </a:bodyPr>
           <a:lstStyle/>
           <a:p>
             <a:r>
@@ -3455,10 +3457,20 @@
               </a:rPr>
               <a:t>https://fonts.google.com/icons?selected=Material+Icons+Outlined</a:t>
             </a:r>
-            <a:r>
-              <a:rPr lang="en-US" dirty="0"/>
-              <a:t>  </a:t>
-            </a:r>
+            <a:endParaRPr lang="en-US" dirty="0"/>
+          </a:p>
+          <a:p>
+            <a:r>
+              <a:rPr lang="en-US">
+                <a:hlinkClick r:id="rId8"/>
+              </a:rPr>
+              <a:t>https://developer.mozilla.org/fr/docs/Web/JavaScript/Reference/Global_Objects/Array</a:t>
+            </a:r>
+            <a:r>
+              <a:rPr lang="en-US"/>
+              <a:t>   </a:t>
+            </a:r>
+            <a:endParaRPr lang="en-US" dirty="0"/>
           </a:p>
           <a:p>
             <a:pPr marL="0" indent="0">

</xml_diff>